<commit_message>
huffman table to tree
</commit_message>
<xml_diff>
--- a/information/2015 - week 8 Assesment.pptx
+++ b/information/2015 - week 8 Assesment.pptx
@@ -2367,8 +2367,8 @@
         </p:nvSpPr>
         <p:spPr>
           <a:xfrm>
-            <a:off x="457200" y="274680"/>
-            <a:ext cx="8228880" cy="1142640"/>
+            <a:off x="457200" y="273600"/>
+            <a:ext cx="8228880" cy="1144800"/>
           </a:xfrm>
           <a:prstGeom prst="rect">
             <a:avLst/>
@@ -2400,7 +2400,7 @@
         <p:spPr>
           <a:xfrm>
             <a:off x="457200" y="1604520"/>
-            <a:ext cx="8229240" cy="3977280"/>
+            <a:ext cx="8228880" cy="3976920"/>
           </a:xfrm>
           <a:prstGeom prst="rect">
             <a:avLst/>
@@ -2415,7 +2415,7 @@
               <a:buChar char=""/>
             </a:pPr>
             <a:r>
-              <a:rPr lang="en-IN" sz="3200">
+              <a:rPr lang="en-IN">
                 <a:latin typeface="Arial"/>
               </a:rPr>
               <a:t>Click to edit the outline text format</a:t>
@@ -2429,7 +2429,7 @@
               <a:buChar char=""/>
             </a:pPr>
             <a:r>
-              <a:rPr lang="en-IN" sz="2800">
+              <a:rPr lang="en-IN">
                 <a:latin typeface="Arial"/>
               </a:rPr>
               <a:t>Second Outline Level</a:t>
@@ -2443,7 +2443,7 @@
               <a:buChar char=""/>
             </a:pPr>
             <a:r>
-              <a:rPr lang="en-IN" sz="2400">
+              <a:rPr lang="en-IN">
                 <a:latin typeface="Arial"/>
               </a:rPr>
               <a:t>Third Outline Level</a:t>
@@ -2457,7 +2457,7 @@
               <a:buChar char=""/>
             </a:pPr>
             <a:r>
-              <a:rPr lang="en-IN" sz="2000">
+              <a:rPr lang="en-IN">
                 <a:latin typeface="Arial"/>
               </a:rPr>
               <a:t>Fourth Outline Level</a:t>
@@ -2471,7 +2471,7 @@
               <a:buChar char=""/>
             </a:pPr>
             <a:r>
-              <a:rPr lang="en-IN" sz="2000">
+              <a:rPr lang="en-IN">
                 <a:latin typeface="Arial"/>
               </a:rPr>
               <a:t>Fifth Outline Level</a:t>
@@ -2485,7 +2485,7 @@
               <a:buChar char=""/>
             </a:pPr>
             <a:r>
-              <a:rPr lang="en-IN" sz="2000">
+              <a:rPr lang="en-IN">
                 <a:latin typeface="Arial"/>
               </a:rPr>
               <a:t>Sixth Outline Level</a:t>
@@ -2499,7 +2499,7 @@
               <a:buChar char=""/>
             </a:pPr>
             <a:r>
-              <a:rPr lang="en-IN" sz="2000">
+              <a:rPr lang="en-IN">
                 <a:latin typeface="Arial"/>
               </a:rPr>
               <a:t>Seventh Outline Level</a:t>
@@ -2752,7 +2752,7 @@
         <p:spPr>
           <a:xfrm>
             <a:off x="685800" y="2130480"/>
-            <a:ext cx="7771680" cy="1469160"/>
+            <a:ext cx="7771320" cy="1468800"/>
           </a:xfrm>
           <a:prstGeom prst="rect">
             <a:avLst/>
@@ -2792,7 +2792,7 @@
         <p:spPr>
           <a:xfrm>
             <a:off x="304920" y="3124080"/>
-            <a:ext cx="8609760" cy="1751760"/>
+            <a:ext cx="8609400" cy="1751400"/>
           </a:xfrm>
           <a:prstGeom prst="rect">
             <a:avLst/>
@@ -2898,7 +2898,7 @@
         <p:spPr>
           <a:xfrm>
             <a:off x="457200" y="274680"/>
-            <a:ext cx="8228880" cy="1142280"/>
+            <a:ext cx="8228520" cy="1141920"/>
           </a:xfrm>
           <a:prstGeom prst="rect">
             <a:avLst/>
@@ -2938,7 +2938,7 @@
         <p:spPr>
           <a:xfrm>
             <a:off x="457200" y="1600200"/>
-            <a:ext cx="8228880" cy="4799880"/>
+            <a:ext cx="8228520" cy="4799520"/>
           </a:xfrm>
           <a:prstGeom prst="rect">
             <a:avLst/>
@@ -2959,7 +2959,7 @@
               <a:buAutoNum type="arabicPeriod"/>
             </a:pPr>
             <a:r>
-              <a:rPr lang="en-IN" sz="3200">
+              <a:rPr lang="en-IN" sz="2000">
                 <a:solidFill>
                   <a:srgbClr val="000000"/>
                 </a:solidFill>
@@ -2978,7 +2978,7 @@
               <a:buAutoNum type="arabicPeriod"/>
             </a:pPr>
             <a:r>
-              <a:rPr lang="en-IN" sz="3200">
+              <a:rPr lang="en-IN" sz="2000">
                 <a:solidFill>
                   <a:srgbClr val="000000"/>
                 </a:solidFill>
@@ -2995,7 +2995,7 @@
               </a:lnSpc>
             </a:pPr>
             <a:r>
-              <a:rPr lang="en-IN" sz="2800">
+              <a:rPr lang="en-IN" sz="2000">
                 <a:solidFill>
                   <a:srgbClr val="000000"/>
                 </a:solidFill>
@@ -3012,7 +3012,7 @@
               </a:lnSpc>
             </a:pPr>
             <a:r>
-              <a:rPr lang="en-IN" sz="2800">
+              <a:rPr lang="en-IN" sz="2000">
                 <a:solidFill>
                   <a:srgbClr val="000000"/>
                 </a:solidFill>
@@ -3021,7 +3021,7 @@
               <a:t>Block: 1 row of DCT coefficients, 2</a:t>
             </a:r>
             <a:r>
-              <a:rPr lang="en-IN" sz="2800" baseline="30000">
+              <a:rPr lang="en-IN" sz="2000" baseline="30000">
                 <a:solidFill>
                   <a:srgbClr val="000000"/>
                 </a:solidFill>
@@ -3030,7 +3030,7 @@
               <a:t>nd</a:t>
             </a:r>
             <a:r>
-              <a:rPr lang="en-IN" sz="2800">
+              <a:rPr lang="en-IN" sz="2000">
                 <a:solidFill>
                   <a:srgbClr val="000000"/>
                 </a:solidFill>
@@ -3039,7 +3039,7 @@
               <a:t> row, 3</a:t>
             </a:r>
             <a:r>
-              <a:rPr lang="en-IN" sz="2800" baseline="30000">
+              <a:rPr lang="en-IN" sz="2000" baseline="30000">
                 <a:solidFill>
                   <a:srgbClr val="000000"/>
                 </a:solidFill>
@@ -3048,7 +3048,7 @@
               <a:t>rd</a:t>
             </a:r>
             <a:r>
-              <a:rPr lang="en-IN" sz="2800">
+              <a:rPr lang="en-IN" sz="2000">
                 <a:solidFill>
                   <a:srgbClr val="000000"/>
                 </a:solidFill>
@@ -3067,7 +3067,7 @@
               <a:buAutoNum type="arabicPeriod"/>
             </a:pPr>
             <a:r>
-              <a:rPr lang="en-IN" sz="3200">
+              <a:rPr lang="en-IN" sz="2000">
                 <a:solidFill>
                   <a:srgbClr val="000000"/>
                 </a:solidFill>
@@ -3084,7 +3084,7 @@
               </a:lnSpc>
             </a:pPr>
             <a:r>
-              <a:rPr lang="en-IN" sz="2800">
+              <a:rPr lang="en-IN" sz="2000">
                 <a:solidFill>
                   <a:srgbClr val="000000"/>
                 </a:solidFill>
@@ -3103,7 +3103,7 @@
               <a:buAutoNum type="arabicPeriod"/>
             </a:pPr>
             <a:r>
-              <a:rPr lang="en-IN" sz="3200">
+              <a:rPr lang="en-IN" sz="2000">
                 <a:solidFill>
                   <a:srgbClr val="000000"/>
                 </a:solidFill>
@@ -3122,7 +3122,7 @@
               <a:buAutoNum type="arabicPeriod"/>
             </a:pPr>
             <a:r>
-              <a:rPr lang="en-IN" sz="3200">
+              <a:rPr lang="en-IN" sz="2000">
                 <a:solidFill>
                   <a:srgbClr val="000000"/>
                 </a:solidFill>
@@ -3208,7 +3208,7 @@
         <p:spPr>
           <a:xfrm>
             <a:off x="457200" y="274680"/>
-            <a:ext cx="8228880" cy="1142280"/>
+            <a:ext cx="8228520" cy="1141920"/>
           </a:xfrm>
           <a:prstGeom prst="rect">
             <a:avLst/>
@@ -3248,7 +3248,7 @@
         <p:spPr>
           <a:xfrm>
             <a:off x="457200" y="1600200"/>
-            <a:ext cx="8228880" cy="4799880"/>
+            <a:ext cx="8228520" cy="4799520"/>
           </a:xfrm>
           <a:prstGeom prst="rect">
             <a:avLst/>

</xml_diff>